<commit_message>
Ang prezentacja - up to conflicting interests
</commit_message>
<xml_diff>
--- a/Egzaminy doktorskie/angielski/SSI_forHEI_QMS.pptx
+++ b/Egzaminy doktorskie/angielski/SSI_forHEI_QMS.pptx
@@ -6,7 +6,13 @@
   </p:sldMasterIdLst>
   <p:sldIdLst>
     <p:sldId id="256" r:id="rId2"/>
-    <p:sldId id="257" r:id="rId3"/>
+    <p:sldId id="260" r:id="rId3"/>
+    <p:sldId id="257" r:id="rId4"/>
+    <p:sldId id="258" r:id="rId5"/>
+    <p:sldId id="262" r:id="rId6"/>
+    <p:sldId id="264" r:id="rId7"/>
+    <p:sldId id="259" r:id="rId8"/>
+    <p:sldId id="261" r:id="rId9"/>
   </p:sldIdLst>
   <p:sldSz cx="12192000" cy="6858000"/>
   <p:notesSz cx="6858000" cy="9144000"/>
@@ -260,7 +266,7 @@
           <a:p>
             <a:fld id="{70917C1B-C20C-4376-AFC4-F5CC3CD2B15E}" type="datetimeFigureOut">
               <a:rPr lang="pl-PL" smtClean="0"/>
-              <a:t>06.09.2024</a:t>
+              <a:t>08.09.2024</a:t>
             </a:fld>
             <a:endParaRPr lang="pl-PL"/>
           </a:p>
@@ -458,7 +464,7 @@
           <a:p>
             <a:fld id="{70917C1B-C20C-4376-AFC4-F5CC3CD2B15E}" type="datetimeFigureOut">
               <a:rPr lang="pl-PL" smtClean="0"/>
-              <a:t>06.09.2024</a:t>
+              <a:t>08.09.2024</a:t>
             </a:fld>
             <a:endParaRPr lang="pl-PL"/>
           </a:p>
@@ -666,7 +672,7 @@
           <a:p>
             <a:fld id="{70917C1B-C20C-4376-AFC4-F5CC3CD2B15E}" type="datetimeFigureOut">
               <a:rPr lang="pl-PL" smtClean="0"/>
-              <a:t>06.09.2024</a:t>
+              <a:t>08.09.2024</a:t>
             </a:fld>
             <a:endParaRPr lang="pl-PL"/>
           </a:p>
@@ -864,7 +870,7 @@
           <a:p>
             <a:fld id="{70917C1B-C20C-4376-AFC4-F5CC3CD2B15E}" type="datetimeFigureOut">
               <a:rPr lang="pl-PL" smtClean="0"/>
-              <a:t>06.09.2024</a:t>
+              <a:t>08.09.2024</a:t>
             </a:fld>
             <a:endParaRPr lang="pl-PL"/>
           </a:p>
@@ -1139,7 +1145,7 @@
           <a:p>
             <a:fld id="{70917C1B-C20C-4376-AFC4-F5CC3CD2B15E}" type="datetimeFigureOut">
               <a:rPr lang="pl-PL" smtClean="0"/>
-              <a:t>06.09.2024</a:t>
+              <a:t>08.09.2024</a:t>
             </a:fld>
             <a:endParaRPr lang="pl-PL"/>
           </a:p>
@@ -1404,7 +1410,7 @@
           <a:p>
             <a:fld id="{70917C1B-C20C-4376-AFC4-F5CC3CD2B15E}" type="datetimeFigureOut">
               <a:rPr lang="pl-PL" smtClean="0"/>
-              <a:t>06.09.2024</a:t>
+              <a:t>08.09.2024</a:t>
             </a:fld>
             <a:endParaRPr lang="pl-PL"/>
           </a:p>
@@ -1816,7 +1822,7 @@
           <a:p>
             <a:fld id="{70917C1B-C20C-4376-AFC4-F5CC3CD2B15E}" type="datetimeFigureOut">
               <a:rPr lang="pl-PL" smtClean="0"/>
-              <a:t>06.09.2024</a:t>
+              <a:t>08.09.2024</a:t>
             </a:fld>
             <a:endParaRPr lang="pl-PL"/>
           </a:p>
@@ -1957,7 +1963,7 @@
           <a:p>
             <a:fld id="{70917C1B-C20C-4376-AFC4-F5CC3CD2B15E}" type="datetimeFigureOut">
               <a:rPr lang="pl-PL" smtClean="0"/>
-              <a:t>06.09.2024</a:t>
+              <a:t>08.09.2024</a:t>
             </a:fld>
             <a:endParaRPr lang="pl-PL"/>
           </a:p>
@@ -2070,7 +2076,7 @@
           <a:p>
             <a:fld id="{70917C1B-C20C-4376-AFC4-F5CC3CD2B15E}" type="datetimeFigureOut">
               <a:rPr lang="pl-PL" smtClean="0"/>
-              <a:t>06.09.2024</a:t>
+              <a:t>08.09.2024</a:t>
             </a:fld>
             <a:endParaRPr lang="pl-PL"/>
           </a:p>
@@ -2381,7 +2387,7 @@
           <a:p>
             <a:fld id="{70917C1B-C20C-4376-AFC4-F5CC3CD2B15E}" type="datetimeFigureOut">
               <a:rPr lang="pl-PL" smtClean="0"/>
-              <a:t>06.09.2024</a:t>
+              <a:t>08.09.2024</a:t>
             </a:fld>
             <a:endParaRPr lang="pl-PL"/>
           </a:p>
@@ -2669,7 +2675,7 @@
           <a:p>
             <a:fld id="{70917C1B-C20C-4376-AFC4-F5CC3CD2B15E}" type="datetimeFigureOut">
               <a:rPr lang="pl-PL" smtClean="0"/>
-              <a:t>06.09.2024</a:t>
+              <a:t>08.09.2024</a:t>
             </a:fld>
             <a:endParaRPr lang="pl-PL"/>
           </a:p>
@@ -2910,7 +2916,7 @@
           <a:p>
             <a:fld id="{70917C1B-C20C-4376-AFC4-F5CC3CD2B15E}" type="datetimeFigureOut">
               <a:rPr lang="pl-PL" smtClean="0"/>
-              <a:t>06.09.2024</a:t>
+              <a:t>08.09.2024</a:t>
             </a:fld>
             <a:endParaRPr lang="pl-PL"/>
           </a:p>
@@ -3491,6 +3497,217 @@
           <p:cNvPr id="2" name="Tytuł 1">
             <a:extLst>
               <a:ext uri="{FF2B5EF4-FFF2-40B4-BE49-F238E27FC236}">
+                <a16:creationId xmlns:a16="http://schemas.microsoft.com/office/drawing/2014/main" id="{EF146487-78BF-B718-BD20-9D922B93369A}"/>
+              </a:ext>
+            </a:extLst>
+          </p:cNvPr>
+          <p:cNvSpPr>
+            <a:spLocks noGrp="1"/>
+          </p:cNvSpPr>
+          <p:nvPr>
+            <p:ph type="title"/>
+          </p:nvPr>
+        </p:nvSpPr>
+        <p:spPr/>
+        <p:txBody>
+          <a:bodyPr/>
+          <a:lstStyle/>
+          <a:p>
+            <a:r>
+              <a:rPr lang="pl-PL" dirty="0"/>
+              <a:t>Plan narracji</a:t>
+            </a:r>
+          </a:p>
+        </p:txBody>
+      </p:sp>
+      <p:sp>
+        <p:nvSpPr>
+          <p:cNvPr id="3" name="Symbol zastępczy zawartości 2">
+            <a:extLst>
+              <a:ext uri="{FF2B5EF4-FFF2-40B4-BE49-F238E27FC236}">
+                <a16:creationId xmlns:a16="http://schemas.microsoft.com/office/drawing/2014/main" id="{E78D3559-3162-A0D8-F760-5A7FD0A881F4}"/>
+              </a:ext>
+            </a:extLst>
+          </p:cNvPr>
+          <p:cNvSpPr>
+            <a:spLocks noGrp="1"/>
+          </p:cNvSpPr>
+          <p:nvPr>
+            <p:ph idx="1"/>
+          </p:nvPr>
+        </p:nvSpPr>
+        <p:spPr/>
+        <p:txBody>
+          <a:bodyPr>
+            <a:normAutofit fontScale="55000" lnSpcReduction="20000"/>
+          </a:bodyPr>
+          <a:lstStyle/>
+          <a:p>
+            <a:r>
+              <a:rPr lang="pl-PL" dirty="0"/>
+              <a:t>Dlaczego warto zająć się tematem?: uniwersytety są  „silnikiem” rozwoju społecznego, gospodarczego i kulturowego</a:t>
+            </a:r>
+            <a:r>
+              <a:rPr lang="pl-PL" baseline="30000" dirty="0"/>
+              <a:t>1</a:t>
+            </a:r>
+            <a:r>
+              <a:rPr lang="pl-PL" dirty="0"/>
+              <a:t> , pozycja polskich uczelni w świecie nauki nie odpowiada pozycji ani potencjałowi Polski w globalnej gospodarce. Ponadto polscy naukowcy osiągają wiele sukcesów naukowych, które nie są odpowiednio komercjalizowane przez polskie przedsiębiorstwa.</a:t>
+            </a:r>
+          </a:p>
+          <a:p>
+            <a:r>
+              <a:rPr lang="pl-PL" dirty="0"/>
+              <a:t>Skąd mogą się brać obecne problemy?: Silna kultura akademicka związana z odwoływaniem się do wielowiekowej tradycji; konflikt tradycja a nowoczesność to często sprzeczność między koncepcją uniwersytetu liberalnego i uniwersytetu przedsiębiorczego, a obecnie także z cechami uniwersytetu społecznie odpowiedzialnego; żadna nie może być w pełni </a:t>
+            </a:r>
+            <a:r>
+              <a:rPr lang="pl-PL" dirty="0" err="1"/>
+              <a:t>rezalizowana</a:t>
+            </a:r>
+            <a:r>
+              <a:rPr lang="pl-PL" dirty="0"/>
+              <a:t> przez różne ograniczenia (w tym regulacje prawne); </a:t>
+            </a:r>
+          </a:p>
+          <a:p>
+            <a:endParaRPr lang="pl-PL" dirty="0"/>
+          </a:p>
+          <a:p>
+            <a:r>
+              <a:rPr lang="pl-PL" dirty="0"/>
+              <a:t>Sprzeczne oczekiwania różnych interesariuszy; dziedzictwo wielu wieków tradycji uniwersyteckich potęgujących sprzeczności</a:t>
+            </a:r>
+          </a:p>
+          <a:p>
+            <a:r>
+              <a:rPr lang="en-US" sz="2800" b="0" i="0" u="none" strike="noStrike" baseline="0" dirty="0">
+                <a:latin typeface="CIDFont+F1"/>
+              </a:rPr>
+              <a:t>utilitarian goal, formulated as </a:t>
+            </a:r>
+            <a:r>
+              <a:rPr lang="en-US" sz="2800" b="0" i="0" u="none" strike="noStrike" baseline="0" dirty="0">
+                <a:latin typeface="CIDFont+F3"/>
+              </a:rPr>
+              <a:t>development of a method for improving the quality</a:t>
+            </a:r>
+            <a:r>
+              <a:rPr lang="pl-PL" sz="2800" b="0" i="0" u="none" strike="noStrike" baseline="0" dirty="0">
+                <a:latin typeface="CIDFont+F3"/>
+              </a:rPr>
+              <a:t> </a:t>
+            </a:r>
+            <a:r>
+              <a:rPr lang="en-US" sz="2800" b="0" i="0" u="none" strike="noStrike" baseline="0" dirty="0">
+                <a:latin typeface="CIDFont+F3"/>
+              </a:rPr>
+              <a:t>management system of universities, adapted to the specifics of Polish technical universities, using the</a:t>
+            </a:r>
+            <a:r>
+              <a:rPr lang="pl-PL" sz="2800" b="0" i="0" u="none" strike="noStrike" baseline="0" dirty="0">
+                <a:latin typeface="CIDFont+F3"/>
+              </a:rPr>
+              <a:t> </a:t>
+            </a:r>
+            <a:r>
+              <a:rPr lang="en-US" sz="2800" b="0" i="0" u="none" strike="noStrike" baseline="0" dirty="0">
+                <a:latin typeface="CIDFont+F3"/>
+              </a:rPr>
+              <a:t>measurement of satisfaction of various stakeholder groups as one of the indicators of the university’s</a:t>
+            </a:r>
+            <a:r>
+              <a:rPr lang="pl-PL" sz="2800" b="0" i="0" u="none" strike="noStrike" baseline="0" dirty="0">
+                <a:latin typeface="CIDFont+F3"/>
+              </a:rPr>
+              <a:t> performance</a:t>
+            </a:r>
+            <a:endParaRPr lang="pl-PL" dirty="0"/>
+          </a:p>
+          <a:p>
+            <a:r>
+              <a:rPr lang="pl-PL" dirty="0"/>
+              <a:t>W Polsce wiele złych skojarzeń z kolejnymi reformami szkolnictwa wyższego</a:t>
+            </a:r>
+          </a:p>
+          <a:p>
+            <a:r>
+              <a:rPr lang="pl-PL" dirty="0"/>
+              <a:t>Jednocześnie ogromny potencjał w Polsce dla szkolnictwa wyższego; stale utrzymujące się duże zainteresowanie studiowaniem</a:t>
+            </a:r>
+          </a:p>
+          <a:p>
+            <a:r>
+              <a:rPr lang="pl-PL" dirty="0"/>
+              <a:t>[Na obronę: rys. 1 teoria zarządzania jakością – </a:t>
+            </a:r>
+            <a:r>
+              <a:rPr lang="pl-PL" dirty="0" err="1"/>
+              <a:t>kliento</a:t>
+            </a:r>
+            <a:r>
+              <a:rPr lang="pl-PL" dirty="0"/>
+              <a:t>-centryzm]</a:t>
+            </a:r>
+          </a:p>
+          <a:p>
+            <a:r>
+              <a:rPr lang="pl-PL" dirty="0"/>
+              <a:t>[Na obronę: rys. 2 „cykliczność” zmian koncepcji uniwersytetu]</a:t>
+            </a:r>
+          </a:p>
+          <a:p>
+            <a:r>
+              <a:rPr lang="pl-PL" dirty="0"/>
+              <a:t>[Na obronę: rys. 13 do ilustracji sprzecznych interesów]</a:t>
+            </a:r>
+          </a:p>
+          <a:p>
+            <a:r>
+              <a:rPr lang="pl-PL" dirty="0"/>
+              <a:t>[Na obronę: geniusz „i” zamiast tyranii „albo” str. 55]</a:t>
+            </a:r>
+          </a:p>
+          <a:p>
+            <a:endParaRPr lang="pl-PL" dirty="0"/>
+          </a:p>
+        </p:txBody>
+      </p:sp>
+    </p:spTree>
+    <p:extLst>
+      <p:ext uri="{BB962C8B-B14F-4D97-AF65-F5344CB8AC3E}">
+        <p14:creationId xmlns:p14="http://schemas.microsoft.com/office/powerpoint/2010/main" val="2254966267"/>
+      </p:ext>
+    </p:extLst>
+  </p:cSld>
+  <p:clrMapOvr>
+    <a:masterClrMapping/>
+  </p:clrMapOvr>
+</p:sld>
+</file>
+
+<file path=ppt/slides/slide3.xml><?xml version="1.0" encoding="utf-8"?>
+<p:sld xmlns:a="http://schemas.openxmlformats.org/drawingml/2006/main" xmlns:r="http://schemas.openxmlformats.org/officeDocument/2006/relationships" xmlns:p="http://schemas.openxmlformats.org/presentationml/2006/main">
+  <p:cSld>
+    <p:spTree>
+      <p:nvGrpSpPr>
+        <p:cNvPr id="1" name=""/>
+        <p:cNvGrpSpPr/>
+        <p:nvPr/>
+      </p:nvGrpSpPr>
+      <p:grpSpPr>
+        <a:xfrm>
+          <a:off x="0" y="0"/>
+          <a:ext cx="0" cy="0"/>
+          <a:chOff x="0" y="0"/>
+          <a:chExt cx="0" cy="0"/>
+        </a:xfrm>
+      </p:grpSpPr>
+      <p:sp>
+        <p:nvSpPr>
+          <p:cNvPr id="2" name="Tytuł 1">
+            <a:extLst>
+              <a:ext uri="{FF2B5EF4-FFF2-40B4-BE49-F238E27FC236}">
                 <a16:creationId xmlns:a16="http://schemas.microsoft.com/office/drawing/2014/main" id="{01EAFA99-E6F6-9C32-FCD9-295254D965A1}"/>
               </a:ext>
             </a:extLst>
@@ -3507,7 +3724,11 @@
           <a:bodyPr/>
           <a:lstStyle/>
           <a:p>
-            <a:endParaRPr lang="pl-PL"/>
+            <a:r>
+              <a:rPr lang="pl-PL" dirty="0" err="1"/>
+              <a:t>Intro</a:t>
+            </a:r>
+            <a:endParaRPr lang="pl-PL" dirty="0"/>
           </a:p>
         </p:txBody>
       </p:sp>
@@ -3532,7 +3753,418 @@
           <a:bodyPr/>
           <a:lstStyle/>
           <a:p>
-            <a:endParaRPr lang="pl-PL"/>
+            <a:pPr algn="l"/>
+            <a:r>
+              <a:rPr lang="pl-PL" sz="1800" b="0" i="0" u="none" strike="noStrike" baseline="0" dirty="0" err="1">
+                <a:latin typeface="CIDFont+F1"/>
+              </a:rPr>
+              <a:t>Universities</a:t>
+            </a:r>
+            <a:r>
+              <a:rPr lang="pl-PL" sz="1800" b="0" i="0" u="none" strike="noStrike" baseline="0" dirty="0">
+                <a:latin typeface="CIDFont+F1"/>
+              </a:rPr>
+              <a:t> as </a:t>
+            </a:r>
+            <a:r>
+              <a:rPr lang="pl-PL" sz="1800" b="0" i="0" u="none" strike="noStrike" baseline="0" dirty="0" err="1">
+                <a:latin typeface="CIDFont+F1"/>
+              </a:rPr>
+              <a:t>engines</a:t>
+            </a:r>
+            <a:r>
+              <a:rPr lang="pl-PL" sz="1800" b="0" i="0" u="none" strike="noStrike" baseline="0" dirty="0">
+                <a:latin typeface="CIDFont+F1"/>
+              </a:rPr>
+              <a:t> for </a:t>
+            </a:r>
+            <a:r>
+              <a:rPr lang="pl-PL" sz="1800" b="0" i="0" u="none" strike="noStrike" baseline="0" dirty="0" err="1">
+                <a:latin typeface="CIDFont+F1"/>
+              </a:rPr>
+              <a:t>social</a:t>
+            </a:r>
+            <a:r>
+              <a:rPr lang="pl-PL" sz="1800" dirty="0">
+                <a:latin typeface="CIDFont+F1"/>
+              </a:rPr>
+              <a:t>, </a:t>
+            </a:r>
+            <a:r>
+              <a:rPr lang="pl-PL" sz="1800" dirty="0" err="1">
+                <a:latin typeface="CIDFont+F1"/>
+              </a:rPr>
+              <a:t>economical</a:t>
+            </a:r>
+            <a:r>
+              <a:rPr lang="pl-PL" sz="1800" dirty="0">
+                <a:latin typeface="CIDFont+F1"/>
+              </a:rPr>
+              <a:t> </a:t>
+            </a:r>
+            <a:r>
+              <a:rPr lang="pl-PL" sz="1800" dirty="0" err="1">
+                <a:latin typeface="CIDFont+F1"/>
+              </a:rPr>
+              <a:t>an</a:t>
+            </a:r>
+            <a:r>
+              <a:rPr lang="pl-PL" sz="1800" dirty="0">
+                <a:latin typeface="CIDFont+F1"/>
+              </a:rPr>
+              <a:t> </a:t>
+            </a:r>
+            <a:r>
+              <a:rPr lang="pl-PL" sz="1800" dirty="0" err="1">
+                <a:latin typeface="CIDFont+F1"/>
+              </a:rPr>
+              <a:t>cultural</a:t>
+            </a:r>
+            <a:r>
+              <a:rPr lang="pl-PL" sz="1800" dirty="0">
+                <a:latin typeface="CIDFont+F1"/>
+              </a:rPr>
+              <a:t> development</a:t>
+            </a:r>
+            <a:r>
+              <a:rPr lang="pl-PL" sz="1800" baseline="30000" dirty="0">
+                <a:latin typeface="CIDFont+F1"/>
+              </a:rPr>
+              <a:t>1</a:t>
+            </a:r>
+            <a:endParaRPr lang="pl-PL" sz="1800" b="0" i="0" u="none" strike="noStrike" baseline="30000" dirty="0">
+              <a:latin typeface="CIDFont+F1"/>
+            </a:endParaRPr>
+          </a:p>
+          <a:p>
+            <a:pPr algn="l"/>
+            <a:r>
+              <a:rPr lang="pl-PL" sz="1800" dirty="0">
+                <a:latin typeface="CIDFont+F1"/>
+              </a:rPr>
+              <a:t>Technical </a:t>
+            </a:r>
+            <a:r>
+              <a:rPr lang="pl-PL" sz="1800" dirty="0" err="1">
+                <a:latin typeface="CIDFont+F1"/>
+              </a:rPr>
+              <a:t>universities</a:t>
+            </a:r>
+            <a:r>
+              <a:rPr lang="pl-PL" sz="1800" dirty="0">
+                <a:latin typeface="CIDFont+F1"/>
+              </a:rPr>
+              <a:t> </a:t>
+            </a:r>
+            <a:r>
+              <a:rPr lang="pl-PL" sz="1800" dirty="0" err="1">
+                <a:latin typeface="CIDFont+F1"/>
+              </a:rPr>
+              <a:t>has</a:t>
+            </a:r>
+            <a:r>
+              <a:rPr lang="pl-PL" sz="1800" dirty="0">
+                <a:latin typeface="CIDFont+F1"/>
+              </a:rPr>
+              <a:t> a </a:t>
+            </a:r>
+            <a:r>
+              <a:rPr lang="pl-PL" sz="1800" dirty="0" err="1">
+                <a:latin typeface="CIDFont+F1"/>
+              </a:rPr>
+              <a:t>significant</a:t>
+            </a:r>
+            <a:r>
+              <a:rPr lang="pl-PL" sz="1800" dirty="0">
+                <a:latin typeface="CIDFont+F1"/>
+              </a:rPr>
+              <a:t> role for the </a:t>
+            </a:r>
+            <a:r>
+              <a:rPr lang="pl-PL" sz="1800" dirty="0" err="1">
+                <a:latin typeface="CIDFont+F1"/>
+              </a:rPr>
+              <a:t>economical</a:t>
+            </a:r>
+            <a:r>
+              <a:rPr lang="pl-PL" sz="1800" dirty="0">
+                <a:latin typeface="CIDFont+F1"/>
+              </a:rPr>
+              <a:t> </a:t>
+            </a:r>
+            <a:r>
+              <a:rPr lang="pl-PL" sz="1800" dirty="0" err="1">
+                <a:latin typeface="CIDFont+F1"/>
+              </a:rPr>
+              <a:t>growth</a:t>
+            </a:r>
+            <a:r>
+              <a:rPr lang="pl-PL" sz="1800" dirty="0">
+                <a:latin typeface="CIDFont+F1"/>
+              </a:rPr>
+              <a:t> </a:t>
+            </a:r>
+            <a:r>
+              <a:rPr lang="pl-PL" sz="1800" dirty="0" err="1">
+                <a:latin typeface="CIDFont+F1"/>
+              </a:rPr>
+              <a:t>through</a:t>
+            </a:r>
+            <a:r>
+              <a:rPr lang="pl-PL" sz="1800" dirty="0">
+                <a:latin typeface="CIDFont+F1"/>
+              </a:rPr>
+              <a:t> </a:t>
+            </a:r>
+            <a:r>
+              <a:rPr lang="pl-PL" sz="1800" dirty="0" err="1">
+                <a:latin typeface="CIDFont+F1"/>
+              </a:rPr>
+              <a:t>creation</a:t>
+            </a:r>
+            <a:r>
+              <a:rPr lang="pl-PL" sz="1800" dirty="0">
+                <a:latin typeface="CIDFont+F1"/>
+              </a:rPr>
+              <a:t> of </a:t>
+            </a:r>
+            <a:r>
+              <a:rPr lang="pl-PL" sz="1800" dirty="0" err="1">
+                <a:latin typeface="CIDFont+F1"/>
+              </a:rPr>
+              <a:t>innovations</a:t>
+            </a:r>
+            <a:r>
+              <a:rPr lang="pl-PL" sz="1800" dirty="0">
+                <a:latin typeface="CIDFont+F1"/>
+              </a:rPr>
+              <a:t> for </a:t>
+            </a:r>
+            <a:r>
+              <a:rPr lang="pl-PL" sz="1800" dirty="0" err="1">
+                <a:latin typeface="CIDFont+F1"/>
+              </a:rPr>
+              <a:t>technologies</a:t>
+            </a:r>
+            <a:r>
+              <a:rPr lang="pl-PL" sz="1800" dirty="0">
+                <a:latin typeface="CIDFont+F1"/>
+              </a:rPr>
+              <a:t> </a:t>
+            </a:r>
+            <a:endParaRPr lang="pl-PL" sz="1800" b="0" i="0" u="none" strike="noStrike" baseline="0" dirty="0">
+              <a:latin typeface="CIDFont+F1"/>
+            </a:endParaRPr>
+          </a:p>
+          <a:p>
+            <a:pPr algn="l"/>
+            <a:r>
+              <a:rPr lang="en-US" sz="1800" b="0" i="0" u="none" strike="noStrike" baseline="0" dirty="0">
+                <a:latin typeface="CIDFont+F1"/>
+              </a:rPr>
+              <a:t>The subject of this dissertation is quality</a:t>
+            </a:r>
+            <a:r>
+              <a:rPr lang="pl-PL" sz="1800" b="0" i="0" u="none" strike="noStrike" baseline="0" dirty="0">
+                <a:latin typeface="CIDFont+F1"/>
+              </a:rPr>
+              <a:t> </a:t>
+            </a:r>
+            <a:r>
+              <a:rPr lang="en-US" sz="1800" b="0" i="0" u="none" strike="noStrike" baseline="0" dirty="0">
+                <a:latin typeface="CIDFont+F1"/>
+              </a:rPr>
+              <a:t>management and the entities of the research are polish public technical universities</a:t>
+            </a:r>
+            <a:endParaRPr lang="pl-PL" sz="1800" b="0" i="0" u="none" strike="noStrike" baseline="0" dirty="0">
+              <a:latin typeface="CIDFont+F1"/>
+            </a:endParaRPr>
+          </a:p>
+          <a:p>
+            <a:pPr algn="l"/>
+            <a:r>
+              <a:rPr lang="pl-PL" sz="1800" b="0" i="0" u="none" strike="noStrike" baseline="0" dirty="0">
+                <a:latin typeface="CIDFont+F1"/>
+              </a:rPr>
+              <a:t>The </a:t>
+            </a:r>
+            <a:r>
+              <a:rPr lang="pl-PL" sz="1800" b="0" i="0" u="none" strike="noStrike" baseline="0" dirty="0" err="1">
+                <a:latin typeface="CIDFont+F1"/>
+              </a:rPr>
+              <a:t>context</a:t>
+            </a:r>
+            <a:r>
+              <a:rPr lang="pl-PL" sz="1800" b="0" i="0" u="none" strike="noStrike" baseline="0" dirty="0">
+                <a:latin typeface="CIDFont+F1"/>
+              </a:rPr>
+              <a:t> of the </a:t>
+            </a:r>
+            <a:r>
+              <a:rPr lang="en-US" sz="1800" b="0" i="0" u="none" strike="noStrike" baseline="0" dirty="0">
+                <a:latin typeface="CIDFont+F1"/>
+              </a:rPr>
+              <a:t>specificity of organizations such as universities has allowed for the development and proposition of tools,</a:t>
+            </a:r>
+            <a:r>
+              <a:rPr lang="pl-PL" sz="1800" b="0" i="0" u="none" strike="noStrike" baseline="0" dirty="0">
+                <a:latin typeface="CIDFont+F1"/>
+              </a:rPr>
+              <a:t> </a:t>
+            </a:r>
+            <a:r>
+              <a:rPr lang="en-US" sz="1800" b="0" i="0" u="none" strike="noStrike" baseline="0" dirty="0">
+                <a:latin typeface="CIDFont+F1"/>
+              </a:rPr>
+              <a:t>the application of which will be a practical manifestation of stakeholder centrism in organizational management.</a:t>
+            </a:r>
+            <a:endParaRPr lang="pl-PL" sz="1800" b="0" i="0" u="none" strike="noStrike" baseline="0" dirty="0">
+              <a:latin typeface="CIDFont+F1"/>
+            </a:endParaRPr>
+          </a:p>
+          <a:p>
+            <a:pPr algn="l"/>
+            <a:r>
+              <a:rPr lang="pl-PL" sz="1800" dirty="0" err="1">
+                <a:latin typeface="CIDFont+F1"/>
+              </a:rPr>
+              <a:t>Cognitive</a:t>
+            </a:r>
+            <a:r>
+              <a:rPr lang="pl-PL" sz="1800" dirty="0">
+                <a:latin typeface="CIDFont+F1"/>
+              </a:rPr>
+              <a:t> </a:t>
+            </a:r>
+            <a:r>
+              <a:rPr lang="pl-PL" sz="1800" dirty="0" err="1">
+                <a:latin typeface="CIDFont+F1"/>
+              </a:rPr>
+              <a:t>goal</a:t>
+            </a:r>
+            <a:r>
+              <a:rPr lang="pl-PL" sz="1800" dirty="0">
+                <a:latin typeface="CIDFont+F1"/>
+              </a:rPr>
+              <a:t>: </a:t>
+            </a:r>
+            <a:r>
+              <a:rPr lang="en-US" sz="1800" b="0" i="0" u="none" strike="noStrike" baseline="0" dirty="0">
+                <a:latin typeface="CIDFont+F3"/>
+              </a:rPr>
+              <a:t>identify effective methods from the perspective of improving the quality management</a:t>
+            </a:r>
+            <a:r>
+              <a:rPr lang="pl-PL" sz="1800" b="0" i="0" u="none" strike="noStrike" baseline="0" dirty="0">
+                <a:latin typeface="CIDFont+F3"/>
+              </a:rPr>
+              <a:t> </a:t>
+            </a:r>
+            <a:r>
+              <a:rPr lang="en-US" sz="1800" b="0" i="0" u="none" strike="noStrike" baseline="0" dirty="0">
+                <a:latin typeface="CIDFont+F3"/>
+              </a:rPr>
+              <a:t>system, through the measurement and analysis of stakeholder satisfaction levels as an</a:t>
+            </a:r>
+            <a:r>
+              <a:rPr lang="pl-PL" sz="1800" b="0" i="0" u="none" strike="noStrike" baseline="0" dirty="0">
+                <a:latin typeface="CIDFont+F3"/>
+              </a:rPr>
+              <a:t> </a:t>
+            </a:r>
+            <a:r>
+              <a:rPr lang="pl-PL" sz="1800" b="0" i="0" u="none" strike="noStrike" baseline="0" dirty="0" err="1">
+                <a:latin typeface="CIDFont+F3"/>
+              </a:rPr>
+              <a:t>indicator</a:t>
+            </a:r>
+            <a:r>
+              <a:rPr lang="pl-PL" sz="1800" b="0" i="0" u="none" strike="noStrike" baseline="0" dirty="0">
+                <a:latin typeface="CIDFont+F3"/>
+              </a:rPr>
+              <a:t> of </a:t>
+            </a:r>
+            <a:r>
+              <a:rPr lang="pl-PL" sz="1800" b="0" i="0" u="none" strike="noStrike" baseline="0" dirty="0" err="1">
+                <a:latin typeface="CIDFont+F3"/>
+              </a:rPr>
+              <a:t>quality</a:t>
+            </a:r>
+            <a:endParaRPr lang="pl-PL" sz="1800" b="0" i="0" u="none" strike="noStrike" baseline="0" dirty="0">
+              <a:latin typeface="CIDFont+F3"/>
+            </a:endParaRPr>
+          </a:p>
+          <a:p>
+            <a:pPr algn="l"/>
+            <a:r>
+              <a:rPr lang="pl-PL" sz="1800" dirty="0">
+                <a:latin typeface="CIDFont+F1"/>
+              </a:rPr>
+              <a:t>U</a:t>
+            </a:r>
+            <a:r>
+              <a:rPr lang="en-US" sz="1800" b="0" i="0" u="none" strike="noStrike" baseline="0" dirty="0" err="1">
+                <a:latin typeface="CIDFont+F1"/>
+              </a:rPr>
+              <a:t>tilitarian</a:t>
+            </a:r>
+            <a:r>
+              <a:rPr lang="en-US" sz="1800" b="0" i="0" u="none" strike="noStrike" baseline="0" dirty="0">
+                <a:latin typeface="CIDFont+F1"/>
+              </a:rPr>
+              <a:t> goal</a:t>
+            </a:r>
+            <a:r>
+              <a:rPr lang="pl-PL" sz="1800" b="0" i="0" u="none" strike="noStrike" baseline="0" dirty="0">
+                <a:latin typeface="CIDFont+F1"/>
+              </a:rPr>
+              <a:t>:</a:t>
+            </a:r>
+            <a:r>
+              <a:rPr lang="en-US" sz="1800" b="0" i="0" u="none" strike="noStrike" baseline="0" dirty="0">
+                <a:latin typeface="CIDFont+F1"/>
+              </a:rPr>
+              <a:t> </a:t>
+            </a:r>
+            <a:r>
+              <a:rPr lang="en-US" sz="1800" b="0" i="0" u="none" strike="noStrike" baseline="0" dirty="0">
+                <a:latin typeface="CIDFont+F3"/>
+              </a:rPr>
+              <a:t>development of a method for improving the quality</a:t>
+            </a:r>
+            <a:r>
+              <a:rPr lang="pl-PL" sz="1800" b="0" i="0" u="none" strike="noStrike" baseline="0" dirty="0">
+                <a:latin typeface="CIDFont+F3"/>
+              </a:rPr>
+              <a:t> </a:t>
+            </a:r>
+            <a:r>
+              <a:rPr lang="en-US" sz="1800" b="0" i="0" u="none" strike="noStrike" baseline="0" dirty="0">
+                <a:latin typeface="CIDFont+F3"/>
+              </a:rPr>
+              <a:t>management system of universities, adapted to the specifics of Polish technical universities, using the</a:t>
+            </a:r>
+            <a:r>
+              <a:rPr lang="pl-PL" sz="1800" b="0" i="0" u="none" strike="noStrike" baseline="0" dirty="0">
+                <a:latin typeface="CIDFont+F3"/>
+              </a:rPr>
+              <a:t> </a:t>
+            </a:r>
+            <a:r>
+              <a:rPr lang="en-US" sz="1800" b="0" i="0" u="none" strike="noStrike" baseline="0" dirty="0">
+                <a:latin typeface="CIDFont+F3"/>
+              </a:rPr>
+              <a:t>measurement of satisfaction of various stakeholder groups as one of the indicators of the university’s</a:t>
+            </a:r>
+            <a:r>
+              <a:rPr lang="pl-PL" sz="1800" b="0" i="0" u="none" strike="noStrike" baseline="0" dirty="0">
+                <a:latin typeface="CIDFont+F3"/>
+              </a:rPr>
+              <a:t> performance</a:t>
+            </a:r>
+            <a:endParaRPr lang="pl-PL" sz="1800" b="0" i="0" u="none" strike="noStrike" baseline="0" dirty="0">
+              <a:latin typeface="CIDFont+F1"/>
+            </a:endParaRPr>
           </a:p>
         </p:txBody>
       </p:sp>
@@ -3540,6 +4172,1474 @@
     <p:extLst>
       <p:ext uri="{BB962C8B-B14F-4D97-AF65-F5344CB8AC3E}">
         <p14:creationId xmlns:p14="http://schemas.microsoft.com/office/powerpoint/2010/main" val="3516573501"/>
+      </p:ext>
+    </p:extLst>
+  </p:cSld>
+  <p:clrMapOvr>
+    <a:masterClrMapping/>
+  </p:clrMapOvr>
+</p:sld>
+</file>
+
+<file path=ppt/slides/slide4.xml><?xml version="1.0" encoding="utf-8"?>
+<p:sld xmlns:a="http://schemas.openxmlformats.org/drawingml/2006/main" xmlns:r="http://schemas.openxmlformats.org/officeDocument/2006/relationships" xmlns:p="http://schemas.openxmlformats.org/presentationml/2006/main">
+  <p:cSld>
+    <p:spTree>
+      <p:nvGrpSpPr>
+        <p:cNvPr id="1" name=""/>
+        <p:cNvGrpSpPr/>
+        <p:nvPr/>
+      </p:nvGrpSpPr>
+      <p:grpSpPr>
+        <a:xfrm>
+          <a:off x="0" y="0"/>
+          <a:ext cx="0" cy="0"/>
+          <a:chOff x="0" y="0"/>
+          <a:chExt cx="0" cy="0"/>
+        </a:xfrm>
+      </p:grpSpPr>
+      <p:sp>
+        <p:nvSpPr>
+          <p:cNvPr id="2" name="Tytuł 1">
+            <a:extLst>
+              <a:ext uri="{FF2B5EF4-FFF2-40B4-BE49-F238E27FC236}">
+                <a16:creationId xmlns:a16="http://schemas.microsoft.com/office/drawing/2014/main" id="{01EAFA99-E6F6-9C32-FCD9-295254D965A1}"/>
+              </a:ext>
+            </a:extLst>
+          </p:cNvPr>
+          <p:cNvSpPr>
+            <a:spLocks noGrp="1"/>
+          </p:cNvSpPr>
+          <p:nvPr>
+            <p:ph type="title"/>
+          </p:nvPr>
+        </p:nvSpPr>
+        <p:spPr/>
+        <p:txBody>
+          <a:bodyPr/>
+          <a:lstStyle/>
+          <a:p>
+            <a:r>
+              <a:rPr lang="pl-PL" dirty="0" err="1"/>
+              <a:t>Main</a:t>
+            </a:r>
+            <a:r>
+              <a:rPr lang="pl-PL" dirty="0"/>
+              <a:t> part</a:t>
+            </a:r>
+          </a:p>
+        </p:txBody>
+      </p:sp>
+      <p:sp>
+        <p:nvSpPr>
+          <p:cNvPr id="3" name="Symbol zastępczy zawartości 2">
+            <a:extLst>
+              <a:ext uri="{FF2B5EF4-FFF2-40B4-BE49-F238E27FC236}">
+                <a16:creationId xmlns:a16="http://schemas.microsoft.com/office/drawing/2014/main" id="{9AEEA72C-DA17-8133-04DC-5D0CEE84D90D}"/>
+              </a:ext>
+            </a:extLst>
+          </p:cNvPr>
+          <p:cNvSpPr>
+            <a:spLocks noGrp="1"/>
+          </p:cNvSpPr>
+          <p:nvPr>
+            <p:ph idx="1"/>
+          </p:nvPr>
+        </p:nvSpPr>
+        <p:spPr/>
+        <p:txBody>
+          <a:bodyPr>
+            <a:normAutofit/>
+          </a:bodyPr>
+          <a:lstStyle/>
+          <a:p>
+            <a:pPr algn="l"/>
+            <a:endParaRPr lang="pl-PL" sz="1800" b="0" i="0" u="none" strike="noStrike" baseline="0" dirty="0"/>
+          </a:p>
+          <a:p>
+            <a:pPr algn="l"/>
+            <a:endParaRPr lang="pl-PL" sz="1800" dirty="0"/>
+          </a:p>
+          <a:p>
+            <a:pPr algn="l"/>
+            <a:r>
+              <a:rPr lang="en-US" sz="1800" b="0" i="0" u="none" strike="noStrike" baseline="0" dirty="0"/>
+              <a:t>Universities, due to the complexity of relationships between many groups of people associated</a:t>
+            </a:r>
+            <a:r>
+              <a:rPr lang="pl-PL" sz="1800" b="0" i="0" u="none" strike="noStrike" baseline="0" dirty="0"/>
+              <a:t> </a:t>
+            </a:r>
+            <a:r>
+              <a:rPr lang="en-US" sz="1800" b="0" i="0" u="none" strike="noStrike" baseline="0" dirty="0"/>
+              <a:t>with them, often with divergent interests, are a particularly challenging environment for implementing</a:t>
+            </a:r>
+            <a:r>
+              <a:rPr lang="pl-PL" sz="1800" b="0" i="0" u="none" strike="noStrike" baseline="0" dirty="0"/>
+              <a:t> </a:t>
+            </a:r>
+            <a:r>
+              <a:rPr lang="en-US" sz="1800" b="0" i="0" u="none" strike="noStrike" baseline="0" dirty="0"/>
+              <a:t>modern, mature quality management systems, which is confirmed by the results of the literature research</a:t>
+            </a:r>
+            <a:r>
+              <a:rPr lang="pl-PL" sz="1800" b="0" i="0" u="none" strike="noStrike" baseline="0" dirty="0"/>
+              <a:t> </a:t>
+            </a:r>
+            <a:r>
+              <a:rPr lang="pl-PL" sz="1800" b="0" i="0" u="none" strike="noStrike" baseline="0" dirty="0" err="1"/>
+              <a:t>conducted</a:t>
+            </a:r>
+            <a:r>
+              <a:rPr lang="pl-PL" sz="1800" b="0" i="0" u="none" strike="noStrike" baseline="0" dirty="0"/>
+              <a:t>.</a:t>
+            </a:r>
+          </a:p>
+          <a:p>
+            <a:pPr algn="l"/>
+            <a:r>
+              <a:rPr lang="en-US" sz="1800" b="0" i="0" u="none" strike="noStrike" baseline="0" dirty="0"/>
+              <a:t>The reasons for this state of affairs are manifold, from certain features typical of</a:t>
+            </a:r>
+            <a:r>
+              <a:rPr lang="pl-PL" sz="1800" b="0" i="0" u="none" strike="noStrike" baseline="0" dirty="0"/>
+              <a:t> </a:t>
+            </a:r>
+            <a:r>
+              <a:rPr lang="en-US" sz="1800" b="0" i="0" u="none" strike="noStrike" baseline="0" dirty="0"/>
+              <a:t>academic culture, through the complexity of the structure, to difficulties in defining the customer.</a:t>
+            </a:r>
+            <a:endParaRPr lang="pl-PL" sz="1800" dirty="0"/>
+          </a:p>
+          <a:p>
+            <a:pPr algn="l"/>
+            <a:r>
+              <a:rPr lang="pl-PL" sz="1800" b="0" i="0" u="none" strike="noStrike" baseline="0" dirty="0" err="1"/>
+              <a:t>Since</a:t>
+            </a:r>
+            <a:r>
+              <a:rPr lang="pl-PL" sz="1800" b="0" i="0" u="none" strike="noStrike" baseline="0" dirty="0"/>
+              <a:t> </a:t>
+            </a:r>
+            <a:r>
+              <a:rPr lang="en-US" sz="1800" b="0" i="0" u="none" strike="noStrike" baseline="0" dirty="0"/>
+              <a:t>the idea of customer centricity lies at the foundation of contemporary quality management philosophies,</a:t>
+            </a:r>
+            <a:r>
+              <a:rPr lang="pl-PL" sz="1800" b="0" i="0" u="none" strike="noStrike" baseline="0" dirty="0"/>
+              <a:t> </a:t>
+            </a:r>
+            <a:r>
+              <a:rPr lang="en-US" sz="1800" b="0" i="0" u="none" strike="noStrike" baseline="0" dirty="0"/>
+              <a:t>when the customer cannot be unequivocally identified, the basic goals of quality improvement activities</a:t>
+            </a:r>
+            <a:r>
+              <a:rPr lang="pl-PL" sz="1800" b="0" i="0" u="none" strike="noStrike" baseline="0" dirty="0"/>
+              <a:t> </a:t>
+            </a:r>
+            <a:r>
+              <a:rPr lang="pl-PL" sz="1800" b="0" i="0" u="none" strike="noStrike" baseline="0" dirty="0" err="1"/>
+              <a:t>become</a:t>
+            </a:r>
+            <a:r>
+              <a:rPr lang="pl-PL" sz="1800" b="0" i="0" u="none" strike="noStrike" baseline="0" dirty="0"/>
+              <a:t> </a:t>
+            </a:r>
+            <a:r>
+              <a:rPr lang="pl-PL" sz="1800" b="0" i="0" u="none" strike="noStrike" baseline="0" dirty="0" err="1"/>
+              <a:t>unclear</a:t>
+            </a:r>
+            <a:r>
+              <a:rPr lang="pl-PL" sz="1800" b="0" i="0" u="none" strike="noStrike" baseline="0" dirty="0"/>
+              <a:t>.</a:t>
+            </a:r>
+          </a:p>
+          <a:p>
+            <a:pPr algn="l"/>
+            <a:r>
+              <a:rPr lang="en-US" sz="1800" b="0" i="0" u="none" strike="noStrike" baseline="0" dirty="0">
+                <a:latin typeface="CIDFont+F1"/>
+              </a:rPr>
+              <a:t>Nowadays, in the context of universities, the concept of the customer is commonly</a:t>
+            </a:r>
+            <a:r>
+              <a:rPr lang="pl-PL" sz="1800" b="0" i="0" u="none" strike="noStrike" baseline="0" dirty="0">
+                <a:latin typeface="CIDFont+F1"/>
+              </a:rPr>
+              <a:t> </a:t>
+            </a:r>
+            <a:r>
+              <a:rPr lang="en-US" sz="1800" b="0" i="0" u="none" strike="noStrike" baseline="0" dirty="0">
+                <a:latin typeface="CIDFont+F1"/>
+              </a:rPr>
+              <a:t>replaced by the concept of stakeholders. Therefore, the author suggests that stakeholder analysis and</a:t>
+            </a:r>
+            <a:r>
+              <a:rPr lang="pl-PL" sz="1800" b="0" i="0" u="none" strike="noStrike" baseline="0" dirty="0">
+                <a:latin typeface="CIDFont+F1"/>
+              </a:rPr>
+              <a:t> </a:t>
+            </a:r>
+            <a:r>
+              <a:rPr lang="en-US" sz="1800" b="0" i="0" u="none" strike="noStrike" baseline="0" dirty="0">
+                <a:latin typeface="CIDFont+F1"/>
+              </a:rPr>
+              <a:t>the measurement of stakeholder satisfaction should form the basis of all improvement actions.</a:t>
+            </a:r>
+            <a:endParaRPr lang="pl-PL" sz="1800" b="0" i="0" u="none" strike="noStrike" baseline="0" dirty="0">
+              <a:latin typeface="CIDFont+F1"/>
+            </a:endParaRPr>
+          </a:p>
+          <a:p>
+            <a:pPr algn="l"/>
+            <a:endParaRPr lang="pl-PL" sz="1800" dirty="0"/>
+          </a:p>
+        </p:txBody>
+      </p:sp>
+    </p:spTree>
+    <p:extLst>
+      <p:ext uri="{BB962C8B-B14F-4D97-AF65-F5344CB8AC3E}">
+        <p14:creationId xmlns:p14="http://schemas.microsoft.com/office/powerpoint/2010/main" val="1615469987"/>
+      </p:ext>
+    </p:extLst>
+  </p:cSld>
+  <p:clrMapOvr>
+    <a:masterClrMapping/>
+  </p:clrMapOvr>
+</p:sld>
+</file>
+
+<file path=ppt/slides/slide5.xml><?xml version="1.0" encoding="utf-8"?>
+<p:sld xmlns:a="http://schemas.openxmlformats.org/drawingml/2006/main" xmlns:r="http://schemas.openxmlformats.org/officeDocument/2006/relationships" xmlns:p="http://schemas.openxmlformats.org/presentationml/2006/main">
+  <p:cSld>
+    <p:spTree>
+      <p:nvGrpSpPr>
+        <p:cNvPr id="1" name=""/>
+        <p:cNvGrpSpPr/>
+        <p:nvPr/>
+      </p:nvGrpSpPr>
+      <p:grpSpPr>
+        <a:xfrm>
+          <a:off x="0" y="0"/>
+          <a:ext cx="0" cy="0"/>
+          <a:chOff x="0" y="0"/>
+          <a:chExt cx="0" cy="0"/>
+        </a:xfrm>
+      </p:grpSpPr>
+      <p:sp>
+        <p:nvSpPr>
+          <p:cNvPr id="2" name="Tytuł 1">
+            <a:extLst>
+              <a:ext uri="{FF2B5EF4-FFF2-40B4-BE49-F238E27FC236}">
+                <a16:creationId xmlns:a16="http://schemas.microsoft.com/office/drawing/2014/main" id="{01EAFA99-E6F6-9C32-FCD9-295254D965A1}"/>
+              </a:ext>
+            </a:extLst>
+          </p:cNvPr>
+          <p:cNvSpPr>
+            <a:spLocks noGrp="1"/>
+          </p:cNvSpPr>
+          <p:nvPr>
+            <p:ph type="title"/>
+          </p:nvPr>
+        </p:nvSpPr>
+        <p:spPr/>
+        <p:txBody>
+          <a:bodyPr/>
+          <a:lstStyle/>
+          <a:p>
+            <a:r>
+              <a:rPr lang="pl-PL" dirty="0" err="1"/>
+              <a:t>Main</a:t>
+            </a:r>
+            <a:r>
+              <a:rPr lang="pl-PL" dirty="0"/>
+              <a:t> </a:t>
+            </a:r>
+            <a:r>
+              <a:rPr lang="pl-PL" dirty="0" err="1"/>
+              <a:t>concepts</a:t>
+            </a:r>
+            <a:r>
+              <a:rPr lang="pl-PL" dirty="0"/>
+              <a:t> for </a:t>
+            </a:r>
+            <a:r>
+              <a:rPr lang="pl-PL" dirty="0" err="1"/>
+              <a:t>universities</a:t>
+            </a:r>
+            <a:r>
+              <a:rPr lang="pl-PL" dirty="0"/>
+              <a:t> - radar</a:t>
+            </a:r>
+          </a:p>
+        </p:txBody>
+      </p:sp>
+      <p:sp>
+        <p:nvSpPr>
+          <p:cNvPr id="3" name="Symbol zastępczy zawartości 2">
+            <a:extLst>
+              <a:ext uri="{FF2B5EF4-FFF2-40B4-BE49-F238E27FC236}">
+                <a16:creationId xmlns:a16="http://schemas.microsoft.com/office/drawing/2014/main" id="{9AEEA72C-DA17-8133-04DC-5D0CEE84D90D}"/>
+              </a:ext>
+            </a:extLst>
+          </p:cNvPr>
+          <p:cNvSpPr>
+            <a:spLocks noGrp="1"/>
+          </p:cNvSpPr>
+          <p:nvPr>
+            <p:ph idx="1"/>
+          </p:nvPr>
+        </p:nvSpPr>
+        <p:spPr/>
+        <p:txBody>
+          <a:bodyPr>
+            <a:normAutofit/>
+          </a:bodyPr>
+          <a:lstStyle/>
+          <a:p>
+            <a:pPr algn="l"/>
+            <a:endParaRPr lang="pl-PL" sz="1800" b="0" i="0" u="none" strike="noStrike" baseline="0" dirty="0"/>
+          </a:p>
+          <a:p>
+            <a:pPr algn="l"/>
+            <a:endParaRPr lang="pl-PL" sz="1800" dirty="0"/>
+          </a:p>
+          <a:p>
+            <a:pPr algn="l"/>
+            <a:endParaRPr lang="pl-PL" sz="1800" dirty="0"/>
+          </a:p>
+        </p:txBody>
+      </p:sp>
+      <p:sp>
+        <p:nvSpPr>
+          <p:cNvPr id="6" name="pole tekstowe 5">
+            <a:extLst>
+              <a:ext uri="{FF2B5EF4-FFF2-40B4-BE49-F238E27FC236}">
+                <a16:creationId xmlns:a16="http://schemas.microsoft.com/office/drawing/2014/main" id="{C3202C3E-F339-ADDF-F292-0C12D4F32501}"/>
+              </a:ext>
+            </a:extLst>
+          </p:cNvPr>
+          <p:cNvSpPr txBox="1"/>
+          <p:nvPr/>
+        </p:nvSpPr>
+        <p:spPr>
+          <a:xfrm>
+            <a:off x="9237517" y="2553133"/>
+            <a:ext cx="2047010" cy="2585323"/>
+          </a:xfrm>
+          <a:prstGeom prst="rect">
+            <a:avLst/>
+          </a:prstGeom>
+          <a:noFill/>
+        </p:spPr>
+        <p:txBody>
+          <a:bodyPr wrap="square" rtlCol="0">
+            <a:spAutoFit/>
+          </a:bodyPr>
+          <a:lstStyle/>
+          <a:p>
+            <a:r>
+              <a:rPr lang="pl-PL" b="1" dirty="0"/>
+              <a:t>SR</a:t>
+            </a:r>
+            <a:r>
+              <a:rPr lang="pl-PL" dirty="0"/>
+              <a:t> – </a:t>
+            </a:r>
+            <a:r>
+              <a:rPr lang="pl-PL" dirty="0" err="1"/>
+              <a:t>State</a:t>
+            </a:r>
+            <a:r>
+              <a:rPr lang="pl-PL" dirty="0"/>
+              <a:t> </a:t>
+            </a:r>
+            <a:r>
+              <a:rPr lang="pl-PL" dirty="0" err="1"/>
+              <a:t>Regulations</a:t>
+            </a:r>
+            <a:endParaRPr lang="pl-PL" dirty="0"/>
+          </a:p>
+          <a:p>
+            <a:r>
+              <a:rPr lang="pl-PL" b="1" dirty="0"/>
+              <a:t>AG</a:t>
+            </a:r>
+            <a:r>
+              <a:rPr lang="pl-PL" dirty="0"/>
+              <a:t> – </a:t>
+            </a:r>
+            <a:r>
+              <a:rPr lang="pl-PL" dirty="0" err="1"/>
+              <a:t>Academic</a:t>
+            </a:r>
+            <a:r>
+              <a:rPr lang="pl-PL" dirty="0"/>
+              <a:t> </a:t>
+            </a:r>
+            <a:br>
+              <a:rPr lang="pl-PL" dirty="0"/>
+            </a:br>
+            <a:r>
+              <a:rPr lang="pl-PL" dirty="0" err="1"/>
+              <a:t>self-Governance</a:t>
+            </a:r>
+            <a:endParaRPr lang="pl-PL" dirty="0"/>
+          </a:p>
+          <a:p>
+            <a:r>
+              <a:rPr lang="pl-PL" b="1" dirty="0"/>
+              <a:t>SG</a:t>
+            </a:r>
+            <a:r>
+              <a:rPr lang="pl-PL" dirty="0"/>
+              <a:t> – </a:t>
+            </a:r>
+            <a:r>
+              <a:rPr lang="pl-PL" dirty="0" err="1"/>
+              <a:t>Stakeholder</a:t>
+            </a:r>
+            <a:r>
+              <a:rPr lang="pl-PL" dirty="0"/>
+              <a:t> </a:t>
+            </a:r>
+            <a:r>
+              <a:rPr lang="pl-PL" dirty="0" err="1"/>
+              <a:t>guidance</a:t>
+            </a:r>
+            <a:endParaRPr lang="pl-PL" dirty="0"/>
+          </a:p>
+          <a:p>
+            <a:r>
+              <a:rPr lang="pl-PL" b="1" dirty="0"/>
+              <a:t>MG</a:t>
+            </a:r>
+            <a:r>
+              <a:rPr lang="pl-PL" dirty="0"/>
+              <a:t> – </a:t>
+            </a:r>
+            <a:r>
+              <a:rPr lang="pl-PL" dirty="0" err="1"/>
+              <a:t>Managerial</a:t>
+            </a:r>
+            <a:r>
+              <a:rPr lang="pl-PL" dirty="0"/>
+              <a:t> </a:t>
+            </a:r>
+            <a:r>
+              <a:rPr lang="pl-PL" dirty="0" err="1"/>
+              <a:t>self-Governance</a:t>
+            </a:r>
+            <a:endParaRPr lang="pl-PL" dirty="0"/>
+          </a:p>
+          <a:p>
+            <a:r>
+              <a:rPr lang="pl-PL" b="1" dirty="0"/>
+              <a:t>C</a:t>
+            </a:r>
+            <a:r>
+              <a:rPr lang="pl-PL" dirty="0"/>
+              <a:t> – </a:t>
+            </a:r>
+            <a:r>
+              <a:rPr lang="pl-PL" dirty="0" err="1"/>
+              <a:t>Competition</a:t>
+            </a:r>
+            <a:endParaRPr lang="pl-PL" dirty="0"/>
+          </a:p>
+        </p:txBody>
+      </p:sp>
+      <p:grpSp>
+        <p:nvGrpSpPr>
+          <p:cNvPr id="11" name="Grupa 10">
+            <a:extLst>
+              <a:ext uri="{FF2B5EF4-FFF2-40B4-BE49-F238E27FC236}">
+                <a16:creationId xmlns:a16="http://schemas.microsoft.com/office/drawing/2014/main" id="{721446EF-F0EC-F112-05A4-8D8C2EE55137}"/>
+              </a:ext>
+            </a:extLst>
+          </p:cNvPr>
+          <p:cNvGrpSpPr/>
+          <p:nvPr/>
+        </p:nvGrpSpPr>
+        <p:grpSpPr>
+          <a:xfrm>
+            <a:off x="616752" y="1690688"/>
+            <a:ext cx="7919382" cy="5129794"/>
+            <a:chOff x="616752" y="1690688"/>
+            <a:chExt cx="7919382" cy="5129794"/>
+          </a:xfrm>
+        </p:grpSpPr>
+        <p:pic>
+          <p:nvPicPr>
+            <p:cNvPr id="5" name="Obraz 4">
+              <a:extLst>
+                <a:ext uri="{FF2B5EF4-FFF2-40B4-BE49-F238E27FC236}">
+                  <a16:creationId xmlns:a16="http://schemas.microsoft.com/office/drawing/2014/main" id="{27CC000E-4B98-06A3-E1D7-6F30D50BF93D}"/>
+                </a:ext>
+              </a:extLst>
+            </p:cNvPr>
+            <p:cNvPicPr>
+              <a:picLocks noChangeAspect="1"/>
+            </p:cNvPicPr>
+            <p:nvPr/>
+          </p:nvPicPr>
+          <p:blipFill>
+            <a:blip r:embed="rId2">
+              <a:extLst>
+                <a:ext uri="{28A0092B-C50C-407E-A947-70E740481C1C}">
+                  <a14:useLocalDpi xmlns:a14="http://schemas.microsoft.com/office/drawing/2010/main" val="0"/>
+                </a:ext>
+              </a:extLst>
+            </a:blip>
+            <a:stretch>
+              <a:fillRect/>
+            </a:stretch>
+          </p:blipFill>
+          <p:spPr>
+            <a:xfrm>
+              <a:off x="616752" y="1690688"/>
+              <a:ext cx="7735806" cy="5129794"/>
+            </a:xfrm>
+            <a:prstGeom prst="rect">
+              <a:avLst/>
+            </a:prstGeom>
+          </p:spPr>
+        </p:pic>
+        <p:grpSp>
+          <p:nvGrpSpPr>
+            <p:cNvPr id="10" name="Grupa 9">
+              <a:extLst>
+                <a:ext uri="{FF2B5EF4-FFF2-40B4-BE49-F238E27FC236}">
+                  <a16:creationId xmlns:a16="http://schemas.microsoft.com/office/drawing/2014/main" id="{C4F6DFF3-9781-D8F8-2163-838CBABFA5C7}"/>
+                </a:ext>
+              </a:extLst>
+            </p:cNvPr>
+            <p:cNvGrpSpPr/>
+            <p:nvPr/>
+          </p:nvGrpSpPr>
+          <p:grpSpPr>
+            <a:xfrm>
+              <a:off x="6468340" y="2904260"/>
+              <a:ext cx="2067794" cy="2064226"/>
+              <a:chOff x="6468340" y="2904260"/>
+              <a:chExt cx="2067794" cy="2064226"/>
+            </a:xfrm>
+          </p:grpSpPr>
+          <p:sp>
+            <p:nvSpPr>
+              <p:cNvPr id="7" name="pole tekstowe 6">
+                <a:extLst>
+                  <a:ext uri="{FF2B5EF4-FFF2-40B4-BE49-F238E27FC236}">
+                    <a16:creationId xmlns:a16="http://schemas.microsoft.com/office/drawing/2014/main" id="{70509911-A4FA-5523-E5B4-40B6B8C22E88}"/>
+                  </a:ext>
+                </a:extLst>
+              </p:cNvPr>
+              <p:cNvSpPr txBox="1"/>
+              <p:nvPr/>
+            </p:nvSpPr>
+            <p:spPr>
+              <a:xfrm>
+                <a:off x="6468340" y="2904260"/>
+                <a:ext cx="1958686" cy="584775"/>
+              </a:xfrm>
+              <a:prstGeom prst="rect">
+                <a:avLst/>
+              </a:prstGeom>
+              <a:solidFill>
+                <a:schemeClr val="bg1"/>
+              </a:solidFill>
+            </p:spPr>
+            <p:txBody>
+              <a:bodyPr wrap="square" rtlCol="0">
+                <a:spAutoFit/>
+              </a:bodyPr>
+              <a:lstStyle/>
+              <a:p>
+                <a:r>
+                  <a:rPr lang="pl-PL" sz="1600" dirty="0" err="1"/>
+                  <a:t>Entreprneurial</a:t>
+                </a:r>
+                <a:r>
+                  <a:rPr lang="pl-PL" sz="1600" dirty="0"/>
+                  <a:t> University</a:t>
+                </a:r>
+              </a:p>
+            </p:txBody>
+          </p:sp>
+          <p:sp>
+            <p:nvSpPr>
+              <p:cNvPr id="8" name="pole tekstowe 7">
+                <a:extLst>
+                  <a:ext uri="{FF2B5EF4-FFF2-40B4-BE49-F238E27FC236}">
+                    <a16:creationId xmlns:a16="http://schemas.microsoft.com/office/drawing/2014/main" id="{5351021F-5506-2F1F-01B5-E468EE484EEF}"/>
+                  </a:ext>
+                </a:extLst>
+              </p:cNvPr>
+              <p:cNvSpPr txBox="1"/>
+              <p:nvPr/>
+            </p:nvSpPr>
+            <p:spPr>
+              <a:xfrm>
+                <a:off x="6489124" y="3739645"/>
+                <a:ext cx="2047010" cy="584775"/>
+              </a:xfrm>
+              <a:prstGeom prst="rect">
+                <a:avLst/>
+              </a:prstGeom>
+              <a:solidFill>
+                <a:schemeClr val="bg1"/>
+              </a:solidFill>
+            </p:spPr>
+            <p:txBody>
+              <a:bodyPr wrap="square" rtlCol="0">
+                <a:spAutoFit/>
+              </a:bodyPr>
+              <a:lstStyle/>
+              <a:p>
+                <a:r>
+                  <a:rPr lang="pl-PL" sz="1600" dirty="0" err="1"/>
+                  <a:t>Socially</a:t>
+                </a:r>
+                <a:r>
+                  <a:rPr lang="pl-PL" sz="1600" dirty="0"/>
+                  <a:t> </a:t>
+                </a:r>
+                <a:r>
+                  <a:rPr lang="pl-PL" sz="1600" dirty="0" err="1"/>
+                  <a:t>Responsible</a:t>
+                </a:r>
+                <a:r>
+                  <a:rPr lang="pl-PL" sz="1600" dirty="0"/>
+                  <a:t> University</a:t>
+                </a:r>
+              </a:p>
+            </p:txBody>
+          </p:sp>
+          <p:sp>
+            <p:nvSpPr>
+              <p:cNvPr id="9" name="pole tekstowe 8">
+                <a:extLst>
+                  <a:ext uri="{FF2B5EF4-FFF2-40B4-BE49-F238E27FC236}">
+                    <a16:creationId xmlns:a16="http://schemas.microsoft.com/office/drawing/2014/main" id="{141BB123-9A70-12E5-CFA1-44B54CAC83B3}"/>
+                  </a:ext>
+                </a:extLst>
+              </p:cNvPr>
+              <p:cNvSpPr txBox="1"/>
+              <p:nvPr/>
+            </p:nvSpPr>
+            <p:spPr>
+              <a:xfrm>
+                <a:off x="6468340" y="4629932"/>
+                <a:ext cx="1958686" cy="338554"/>
+              </a:xfrm>
+              <a:prstGeom prst="rect">
+                <a:avLst/>
+              </a:prstGeom>
+              <a:solidFill>
+                <a:schemeClr val="bg1"/>
+              </a:solidFill>
+            </p:spPr>
+            <p:txBody>
+              <a:bodyPr wrap="square" rtlCol="0">
+                <a:spAutoFit/>
+              </a:bodyPr>
+              <a:lstStyle/>
+              <a:p>
+                <a:r>
+                  <a:rPr lang="pl-PL" sz="1600" dirty="0" err="1"/>
+                  <a:t>Liberal</a:t>
+                </a:r>
+                <a:r>
+                  <a:rPr lang="pl-PL" sz="1600" dirty="0"/>
+                  <a:t> University</a:t>
+                </a:r>
+              </a:p>
+            </p:txBody>
+          </p:sp>
+        </p:grpSp>
+      </p:grpSp>
+      <p:sp>
+        <p:nvSpPr>
+          <p:cNvPr id="12" name="pole tekstowe 11">
+            <a:extLst>
+              <a:ext uri="{FF2B5EF4-FFF2-40B4-BE49-F238E27FC236}">
+                <a16:creationId xmlns:a16="http://schemas.microsoft.com/office/drawing/2014/main" id="{FDEE6D3E-84F5-B8E0-3C77-B12CF760BF8D}"/>
+              </a:ext>
+            </a:extLst>
+          </p:cNvPr>
+          <p:cNvSpPr txBox="1"/>
+          <p:nvPr/>
+        </p:nvSpPr>
+        <p:spPr>
+          <a:xfrm>
+            <a:off x="5922818" y="6176963"/>
+            <a:ext cx="4972050" cy="369332"/>
+          </a:xfrm>
+          <a:prstGeom prst="rect">
+            <a:avLst/>
+          </a:prstGeom>
+          <a:noFill/>
+        </p:spPr>
+        <p:txBody>
+          <a:bodyPr wrap="square" rtlCol="0">
+            <a:spAutoFit/>
+          </a:bodyPr>
+          <a:lstStyle/>
+          <a:p>
+            <a:r>
+              <a:rPr lang="pl-PL" baseline="30000" dirty="0"/>
+              <a:t>2</a:t>
+            </a:r>
+            <a:r>
+              <a:rPr lang="pl-PL" dirty="0"/>
+              <a:t> </a:t>
+            </a:r>
+            <a:r>
+              <a:rPr lang="pl-PL" dirty="0" err="1"/>
+              <a:t>literature</a:t>
+            </a:r>
+            <a:r>
+              <a:rPr lang="pl-PL" dirty="0"/>
+              <a:t>: Leja 2011, p. 175</a:t>
+            </a:r>
+          </a:p>
+        </p:txBody>
+      </p:sp>
+    </p:spTree>
+    <p:extLst>
+      <p:ext uri="{BB962C8B-B14F-4D97-AF65-F5344CB8AC3E}">
+        <p14:creationId xmlns:p14="http://schemas.microsoft.com/office/powerpoint/2010/main" val="320412251"/>
+      </p:ext>
+    </p:extLst>
+  </p:cSld>
+  <p:clrMapOvr>
+    <a:masterClrMapping/>
+  </p:clrMapOvr>
+</p:sld>
+</file>
+
+<file path=ppt/slides/slide6.xml><?xml version="1.0" encoding="utf-8"?>
+<p:sld xmlns:a="http://schemas.openxmlformats.org/drawingml/2006/main" xmlns:r="http://schemas.openxmlformats.org/officeDocument/2006/relationships" xmlns:p="http://schemas.openxmlformats.org/presentationml/2006/main">
+  <p:cSld>
+    <p:spTree>
+      <p:nvGrpSpPr>
+        <p:cNvPr id="1" name=""/>
+        <p:cNvGrpSpPr/>
+        <p:nvPr/>
+      </p:nvGrpSpPr>
+      <p:grpSpPr>
+        <a:xfrm>
+          <a:off x="0" y="0"/>
+          <a:ext cx="0" cy="0"/>
+          <a:chOff x="0" y="0"/>
+          <a:chExt cx="0" cy="0"/>
+        </a:xfrm>
+      </p:grpSpPr>
+      <p:sp>
+        <p:nvSpPr>
+          <p:cNvPr id="2" name="Tytuł 1">
+            <a:extLst>
+              <a:ext uri="{FF2B5EF4-FFF2-40B4-BE49-F238E27FC236}">
+                <a16:creationId xmlns:a16="http://schemas.microsoft.com/office/drawing/2014/main" id="{DB6EC187-A11A-B519-3209-BC9B1F37B6E7}"/>
+              </a:ext>
+            </a:extLst>
+          </p:cNvPr>
+          <p:cNvSpPr>
+            <a:spLocks noGrp="1"/>
+          </p:cNvSpPr>
+          <p:nvPr>
+            <p:ph type="title"/>
+          </p:nvPr>
+        </p:nvSpPr>
+        <p:spPr/>
+        <p:txBody>
+          <a:bodyPr/>
+          <a:lstStyle/>
+          <a:p>
+            <a:r>
+              <a:rPr lang="pl-PL" dirty="0" err="1"/>
+              <a:t>Conflicting</a:t>
+            </a:r>
+            <a:r>
+              <a:rPr lang="pl-PL" dirty="0"/>
+              <a:t> </a:t>
+            </a:r>
+            <a:r>
+              <a:rPr lang="pl-PL" dirty="0" err="1"/>
+              <a:t>interests</a:t>
+            </a:r>
+            <a:r>
+              <a:rPr lang="pl-PL" dirty="0"/>
+              <a:t> environment</a:t>
+            </a:r>
+          </a:p>
+        </p:txBody>
+      </p:sp>
+      <p:sp>
+        <p:nvSpPr>
+          <p:cNvPr id="3" name="Symbol zastępczy zawartości 2">
+            <a:extLst>
+              <a:ext uri="{FF2B5EF4-FFF2-40B4-BE49-F238E27FC236}">
+                <a16:creationId xmlns:a16="http://schemas.microsoft.com/office/drawing/2014/main" id="{1A60F0D5-D538-6348-95A8-72F46C1458A0}"/>
+              </a:ext>
+            </a:extLst>
+          </p:cNvPr>
+          <p:cNvSpPr>
+            <a:spLocks noGrp="1"/>
+          </p:cNvSpPr>
+          <p:nvPr>
+            <p:ph idx="1"/>
+          </p:nvPr>
+        </p:nvSpPr>
+        <p:spPr/>
+        <p:txBody>
+          <a:bodyPr/>
+          <a:lstStyle/>
+          <a:p>
+            <a:r>
+              <a:rPr lang="pl-PL" dirty="0">
+                <a:solidFill>
+                  <a:srgbClr val="FF0000"/>
+                </a:solidFill>
+              </a:rPr>
+              <a:t>Przygotować rysunek w </a:t>
+            </a:r>
+            <a:r>
+              <a:rPr lang="pl-PL">
+                <a:solidFill>
+                  <a:srgbClr val="FF0000"/>
+                </a:solidFill>
+              </a:rPr>
+              <a:t>draw.io </a:t>
+            </a:r>
+            <a:r>
+              <a:rPr lang="pl-PL" dirty="0">
+                <a:solidFill>
+                  <a:srgbClr val="FF0000"/>
+                </a:solidFill>
+              </a:rPr>
+              <a:t>– środowisko relacji uniwersytetu – </a:t>
+            </a:r>
+            <a:r>
+              <a:rPr lang="pl-PL" dirty="0" err="1">
+                <a:solidFill>
+                  <a:srgbClr val="FF0000"/>
+                </a:solidFill>
+              </a:rPr>
+              <a:t>pol</a:t>
+            </a:r>
+            <a:r>
+              <a:rPr lang="pl-PL" dirty="0">
+                <a:solidFill>
+                  <a:srgbClr val="FF0000"/>
+                </a:solidFill>
+              </a:rPr>
+              <a:t> i ang.</a:t>
+            </a:r>
+          </a:p>
+        </p:txBody>
+      </p:sp>
+    </p:spTree>
+    <p:extLst>
+      <p:ext uri="{BB962C8B-B14F-4D97-AF65-F5344CB8AC3E}">
+        <p14:creationId xmlns:p14="http://schemas.microsoft.com/office/powerpoint/2010/main" val="2984450038"/>
+      </p:ext>
+    </p:extLst>
+  </p:cSld>
+  <p:clrMapOvr>
+    <a:masterClrMapping/>
+  </p:clrMapOvr>
+</p:sld>
+</file>
+
+<file path=ppt/slides/slide7.xml><?xml version="1.0" encoding="utf-8"?>
+<p:sld xmlns:a="http://schemas.openxmlformats.org/drawingml/2006/main" xmlns:r="http://schemas.openxmlformats.org/officeDocument/2006/relationships" xmlns:p="http://schemas.openxmlformats.org/presentationml/2006/main">
+  <p:cSld>
+    <p:spTree>
+      <p:nvGrpSpPr>
+        <p:cNvPr id="1" name=""/>
+        <p:cNvGrpSpPr/>
+        <p:nvPr/>
+      </p:nvGrpSpPr>
+      <p:grpSpPr>
+        <a:xfrm>
+          <a:off x="0" y="0"/>
+          <a:ext cx="0" cy="0"/>
+          <a:chOff x="0" y="0"/>
+          <a:chExt cx="0" cy="0"/>
+        </a:xfrm>
+      </p:grpSpPr>
+      <p:sp>
+        <p:nvSpPr>
+          <p:cNvPr id="2" name="Tytuł 1">
+            <a:extLst>
+              <a:ext uri="{FF2B5EF4-FFF2-40B4-BE49-F238E27FC236}">
+                <a16:creationId xmlns:a16="http://schemas.microsoft.com/office/drawing/2014/main" id="{01EAFA99-E6F6-9C32-FCD9-295254D965A1}"/>
+              </a:ext>
+            </a:extLst>
+          </p:cNvPr>
+          <p:cNvSpPr>
+            <a:spLocks noGrp="1"/>
+          </p:cNvSpPr>
+          <p:nvPr>
+            <p:ph type="title"/>
+          </p:nvPr>
+        </p:nvSpPr>
+        <p:spPr/>
+        <p:txBody>
+          <a:bodyPr/>
+          <a:lstStyle/>
+          <a:p>
+            <a:r>
+              <a:rPr lang="pl-PL" dirty="0" err="1"/>
+              <a:t>Summary</a:t>
+            </a:r>
+            <a:endParaRPr lang="pl-PL" dirty="0"/>
+          </a:p>
+        </p:txBody>
+      </p:sp>
+      <p:sp>
+        <p:nvSpPr>
+          <p:cNvPr id="3" name="Symbol zastępczy zawartości 2">
+            <a:extLst>
+              <a:ext uri="{FF2B5EF4-FFF2-40B4-BE49-F238E27FC236}">
+                <a16:creationId xmlns:a16="http://schemas.microsoft.com/office/drawing/2014/main" id="{9AEEA72C-DA17-8133-04DC-5D0CEE84D90D}"/>
+              </a:ext>
+            </a:extLst>
+          </p:cNvPr>
+          <p:cNvSpPr>
+            <a:spLocks noGrp="1"/>
+          </p:cNvSpPr>
+          <p:nvPr>
+            <p:ph idx="1"/>
+          </p:nvPr>
+        </p:nvSpPr>
+        <p:spPr/>
+        <p:txBody>
+          <a:bodyPr>
+            <a:normAutofit fontScale="85000" lnSpcReduction="10000"/>
+          </a:bodyPr>
+          <a:lstStyle/>
+          <a:p>
+            <a:pPr algn="l"/>
+            <a:r>
+              <a:rPr lang="en-US" sz="1800" b="0" i="0" u="none" strike="noStrike" baseline="0" dirty="0">
+                <a:latin typeface="CIDFont+F1"/>
+              </a:rPr>
+              <a:t>This dissertation contributes to the development of management and quality sciences through</a:t>
+            </a:r>
+            <a:r>
+              <a:rPr lang="pl-PL" sz="1800" b="0" i="0" u="none" strike="noStrike" baseline="0" dirty="0">
+                <a:latin typeface="CIDFont+F1"/>
+              </a:rPr>
+              <a:t> </a:t>
+            </a:r>
+            <a:r>
+              <a:rPr lang="en-US" sz="1800" b="0" i="0" u="none" strike="noStrike" baseline="0" dirty="0">
+                <a:latin typeface="CIDFont+F1"/>
+              </a:rPr>
+              <a:t>synthesis of quality management theory and stakeholder theory.</a:t>
+            </a:r>
+            <a:endParaRPr lang="pl-PL" sz="1800" b="0" i="0" u="none" strike="noStrike" baseline="0" dirty="0">
+              <a:latin typeface="CIDFont+F1"/>
+            </a:endParaRPr>
+          </a:p>
+          <a:p>
+            <a:pPr algn="l"/>
+            <a:r>
+              <a:rPr lang="en-US" sz="1800" b="0" i="0" u="none" strike="noStrike" baseline="0" dirty="0">
+                <a:latin typeface="CIDFont+F1"/>
+              </a:rPr>
+              <a:t>The conducted qualitative and quantitative research allowed for achieving the cognitive goal of</a:t>
+            </a:r>
+            <a:r>
+              <a:rPr lang="pl-PL" sz="1800" b="0" i="0" u="none" strike="noStrike" baseline="0" dirty="0">
+                <a:latin typeface="CIDFont+F1"/>
+              </a:rPr>
+              <a:t> </a:t>
+            </a:r>
+            <a:r>
+              <a:rPr lang="en-US" sz="1800" b="0" i="0" u="none" strike="noStrike" baseline="0" dirty="0">
+                <a:latin typeface="CIDFont+F1"/>
+              </a:rPr>
+              <a:t>the study, which was to </a:t>
+            </a:r>
+            <a:r>
+              <a:rPr lang="en-US" sz="1800" b="0" i="0" u="none" strike="noStrike" baseline="0" dirty="0">
+                <a:latin typeface="CIDFont+F3"/>
+              </a:rPr>
+              <a:t>identify effective methods from the perspective of improving the quality management</a:t>
+            </a:r>
+            <a:r>
+              <a:rPr lang="pl-PL" sz="1800" b="0" i="0" u="none" strike="noStrike" baseline="0" dirty="0">
+                <a:latin typeface="CIDFont+F3"/>
+              </a:rPr>
+              <a:t> </a:t>
+            </a:r>
+            <a:r>
+              <a:rPr lang="en-US" sz="1800" b="0" i="0" u="none" strike="noStrike" baseline="0" dirty="0">
+                <a:latin typeface="CIDFont+F3"/>
+              </a:rPr>
+              <a:t>system, through the measurement and analysis of stakeholder satisfaction levels as an</a:t>
+            </a:r>
+            <a:r>
+              <a:rPr lang="pl-PL" sz="1800" b="0" i="0" u="none" strike="noStrike" baseline="0" dirty="0">
+                <a:latin typeface="CIDFont+F3"/>
+              </a:rPr>
+              <a:t> </a:t>
+            </a:r>
+            <a:r>
+              <a:rPr lang="pl-PL" sz="1800" b="0" i="0" u="none" strike="noStrike" baseline="0" dirty="0" err="1">
+                <a:latin typeface="CIDFont+F3"/>
+              </a:rPr>
+              <a:t>indicator</a:t>
+            </a:r>
+            <a:r>
+              <a:rPr lang="pl-PL" sz="1800" b="0" i="0" u="none" strike="noStrike" baseline="0" dirty="0">
+                <a:latin typeface="CIDFont+F3"/>
+              </a:rPr>
+              <a:t> of </a:t>
+            </a:r>
+            <a:r>
+              <a:rPr lang="pl-PL" sz="1800" b="0" i="0" u="none" strike="noStrike" baseline="0" dirty="0" err="1">
+                <a:latin typeface="CIDFont+F3"/>
+              </a:rPr>
+              <a:t>quality</a:t>
+            </a:r>
+            <a:r>
+              <a:rPr lang="pl-PL" sz="1800" b="0" i="0" u="none" strike="noStrike" baseline="0" dirty="0">
+                <a:latin typeface="CIDFont+F1"/>
+              </a:rPr>
+              <a:t>.</a:t>
+            </a:r>
+          </a:p>
+          <a:p>
+            <a:pPr algn="l"/>
+            <a:r>
+              <a:rPr lang="en-US" sz="1800" b="0" i="0" u="none" strike="noStrike" baseline="0" dirty="0">
+                <a:latin typeface="CIDFont+F1"/>
+              </a:rPr>
+              <a:t>The utilitarian goal, formulated as </a:t>
+            </a:r>
+            <a:r>
+              <a:rPr lang="en-US" sz="1800" b="0" i="0" u="none" strike="noStrike" baseline="0" dirty="0">
+                <a:latin typeface="CIDFont+F3"/>
+              </a:rPr>
+              <a:t>development of a method for improving the quality</a:t>
+            </a:r>
+            <a:r>
+              <a:rPr lang="pl-PL" sz="1800" b="0" i="0" u="none" strike="noStrike" baseline="0" dirty="0">
+                <a:latin typeface="CIDFont+F3"/>
+              </a:rPr>
+              <a:t> </a:t>
+            </a:r>
+            <a:r>
+              <a:rPr lang="en-US" sz="1800" b="0" i="0" u="none" strike="noStrike" baseline="0" dirty="0">
+                <a:latin typeface="CIDFont+F3"/>
+              </a:rPr>
+              <a:t>management system of universities, adapted to the specifics of Polish technical universities, using the</a:t>
+            </a:r>
+            <a:r>
+              <a:rPr lang="pl-PL" sz="1800" b="0" i="0" u="none" strike="noStrike" baseline="0" dirty="0">
+                <a:latin typeface="CIDFont+F3"/>
+              </a:rPr>
+              <a:t> </a:t>
+            </a:r>
+            <a:r>
+              <a:rPr lang="en-US" sz="1800" b="0" i="0" u="none" strike="noStrike" baseline="0" dirty="0">
+                <a:latin typeface="CIDFont+F3"/>
+              </a:rPr>
+              <a:t>measurement of satisfaction of various stakeholder groups as one of the indicators of the university’s</a:t>
+            </a:r>
+            <a:r>
+              <a:rPr lang="pl-PL" sz="1800" b="0" i="0" u="none" strike="noStrike" baseline="0" dirty="0">
+                <a:latin typeface="CIDFont+F3"/>
+              </a:rPr>
+              <a:t> performance</a:t>
+            </a:r>
+            <a:r>
+              <a:rPr lang="pl-PL" sz="1800" b="0" i="0" u="none" strike="noStrike" baseline="0" dirty="0">
+                <a:latin typeface="CIDFont+F1"/>
+              </a:rPr>
+              <a:t>, was </a:t>
+            </a:r>
+            <a:r>
+              <a:rPr lang="pl-PL" sz="1800" b="0" i="0" u="none" strike="noStrike" baseline="0" dirty="0" err="1">
+                <a:latin typeface="CIDFont+F1"/>
+              </a:rPr>
+              <a:t>also</a:t>
+            </a:r>
+            <a:r>
+              <a:rPr lang="pl-PL" sz="1800" b="0" i="0" u="none" strike="noStrike" baseline="0" dirty="0">
+                <a:latin typeface="CIDFont+F1"/>
+              </a:rPr>
+              <a:t> </a:t>
+            </a:r>
+            <a:r>
+              <a:rPr lang="pl-PL" sz="1800" b="0" i="0" u="none" strike="noStrike" baseline="0" dirty="0" err="1">
+                <a:latin typeface="CIDFont+F1"/>
+              </a:rPr>
+              <a:t>achieved</a:t>
+            </a:r>
+            <a:r>
+              <a:rPr lang="pl-PL" sz="1800" b="0" i="0" u="none" strike="noStrike" baseline="0" dirty="0">
+                <a:latin typeface="CIDFont+F1"/>
+              </a:rPr>
+              <a:t>.</a:t>
+            </a:r>
+          </a:p>
+          <a:p>
+            <a:pPr algn="l"/>
+            <a:r>
+              <a:rPr lang="en-US" sz="1800" b="0" i="0" u="none" strike="noStrike" baseline="0" dirty="0">
+                <a:latin typeface="CIDFont+F1"/>
+              </a:rPr>
+              <a:t>This objective has been achieved with developing Stakeholders Satisfaction</a:t>
+            </a:r>
+            <a:r>
+              <a:rPr lang="pl-PL" sz="1800" b="0" i="0" u="none" strike="noStrike" baseline="0" dirty="0">
+                <a:latin typeface="CIDFont+F1"/>
+              </a:rPr>
+              <a:t> </a:t>
+            </a:r>
+            <a:r>
+              <a:rPr lang="en-US" sz="1800" b="0" i="0" u="none" strike="noStrike" baseline="0" dirty="0">
+                <a:latin typeface="CIDFont+F1"/>
+              </a:rPr>
+              <a:t>Driven Quality Management Model – SSDQM.</a:t>
+            </a:r>
+            <a:endParaRPr lang="pl-PL" sz="1800" b="0" i="0" u="none" strike="noStrike" baseline="0" dirty="0">
+              <a:latin typeface="CIDFont+F1"/>
+            </a:endParaRPr>
+          </a:p>
+          <a:p>
+            <a:pPr algn="l"/>
+            <a:r>
+              <a:rPr lang="en-US" sz="1800" b="0" i="0" u="none" strike="noStrike" baseline="0" dirty="0">
+                <a:latin typeface="CIDFont+F1"/>
+              </a:rPr>
+              <a:t>The model is developed taking into account</a:t>
+            </a:r>
+            <a:r>
+              <a:rPr lang="pl-PL" sz="1800" b="0" i="0" u="none" strike="noStrike" baseline="0" dirty="0">
+                <a:latin typeface="CIDFont+F1"/>
+              </a:rPr>
+              <a:t> </a:t>
+            </a:r>
+            <a:r>
+              <a:rPr lang="en-US" sz="1800" b="0" i="0" u="none" strike="noStrike" baseline="0" dirty="0">
+                <a:latin typeface="CIDFont+F1"/>
+              </a:rPr>
+              <a:t>possible applications in the context of the specifics of Polish technical universities.</a:t>
+            </a:r>
+            <a:endParaRPr lang="pl-PL" sz="1800" b="0" i="0" u="none" strike="noStrike" baseline="0" dirty="0">
+              <a:latin typeface="CIDFont+F1"/>
+            </a:endParaRPr>
+          </a:p>
+          <a:p>
+            <a:pPr algn="l"/>
+            <a:r>
+              <a:rPr lang="pl-PL" sz="1800" b="0" i="0" u="none" strike="noStrike" baseline="0" dirty="0">
+                <a:latin typeface="CIDFont+F1"/>
+              </a:rPr>
+              <a:t>The </a:t>
+            </a:r>
+            <a:r>
+              <a:rPr lang="pl-PL" sz="1800" b="0" i="0" u="none" strike="noStrike" baseline="0" dirty="0" err="1">
+                <a:latin typeface="CIDFont+F1"/>
+              </a:rPr>
+              <a:t>applicative</a:t>
+            </a:r>
+            <a:r>
+              <a:rPr lang="pl-PL" sz="1800" b="0" i="0" u="none" strike="noStrike" baseline="0" dirty="0">
+                <a:latin typeface="CIDFont+F1"/>
+              </a:rPr>
+              <a:t> </a:t>
+            </a:r>
+            <a:r>
+              <a:rPr lang="pl-PL" sz="1800" b="0" i="0" u="none" strike="noStrike" baseline="0" dirty="0" err="1">
+                <a:latin typeface="CIDFont+F1"/>
+              </a:rPr>
+              <a:t>value</a:t>
+            </a:r>
+            <a:r>
+              <a:rPr lang="pl-PL" sz="1800" b="0" i="0" u="none" strike="noStrike" baseline="0" dirty="0">
+                <a:latin typeface="CIDFont+F1"/>
+              </a:rPr>
+              <a:t> </a:t>
+            </a:r>
+            <a:r>
+              <a:rPr lang="en-US" sz="1800" b="0" i="0" u="none" strike="noStrike" baseline="0" dirty="0">
+                <a:latin typeface="CIDFont+F1"/>
+              </a:rPr>
+              <a:t>of the proposed model has been enhanced with recommendations resulting from the conducted research,</a:t>
+            </a:r>
+            <a:r>
+              <a:rPr lang="pl-PL" sz="1800" b="0" i="0" u="none" strike="noStrike" baseline="0" dirty="0">
+                <a:latin typeface="CIDFont+F1"/>
+              </a:rPr>
+              <a:t> </a:t>
+            </a:r>
+            <a:r>
+              <a:rPr lang="en-US" sz="1800" b="0" i="0" u="none" strike="noStrike" baseline="0" dirty="0">
+                <a:latin typeface="CIDFont+F1"/>
+              </a:rPr>
+              <a:t>a significant part of which is the development of a basic set of indicators.</a:t>
+            </a:r>
+            <a:endParaRPr lang="pl-PL" sz="1800" b="0" i="0" u="none" strike="noStrike" baseline="0" dirty="0">
+              <a:latin typeface="CIDFont+F1"/>
+            </a:endParaRPr>
+          </a:p>
+          <a:p>
+            <a:pPr algn="l"/>
+            <a:r>
+              <a:rPr lang="pl-PL" sz="1800" b="0" i="0" u="none" strike="noStrike" baseline="0" dirty="0" err="1">
+                <a:latin typeface="CIDFont+F1"/>
+              </a:rPr>
+              <a:t>These</a:t>
+            </a:r>
+            <a:r>
+              <a:rPr lang="pl-PL" sz="1800" b="0" i="0" u="none" strike="noStrike" baseline="0" dirty="0">
+                <a:latin typeface="CIDFont+F1"/>
+              </a:rPr>
+              <a:t> </a:t>
+            </a:r>
+            <a:r>
+              <a:rPr lang="pl-PL" sz="1800" b="0" i="0" u="none" strike="noStrike" baseline="0" dirty="0" err="1">
+                <a:latin typeface="CIDFont+F1"/>
+              </a:rPr>
+              <a:t>are</a:t>
+            </a:r>
+            <a:r>
+              <a:rPr lang="pl-PL" sz="1800" b="0" i="0" u="none" strike="noStrike" baseline="0" dirty="0">
+                <a:latin typeface="CIDFont+F1"/>
+              </a:rPr>
+              <a:t> </a:t>
+            </a:r>
+            <a:r>
+              <a:rPr lang="pl-PL" sz="1800" b="0" i="0" u="none" strike="noStrike" baseline="0" dirty="0" err="1">
+                <a:latin typeface="CIDFont+F1"/>
+              </a:rPr>
+              <a:t>measures</a:t>
+            </a:r>
+            <a:r>
+              <a:rPr lang="pl-PL" sz="1800" b="0" i="0" u="none" strike="noStrike" baseline="0" dirty="0">
+                <a:latin typeface="CIDFont+F1"/>
+              </a:rPr>
+              <a:t> </a:t>
+            </a:r>
+            <a:r>
+              <a:rPr lang="en-US" sz="1800" b="0" i="0" u="none" strike="noStrike" baseline="0" dirty="0">
+                <a:latin typeface="CIDFont+F1"/>
+              </a:rPr>
+              <a:t>statistically proven to be significant for the environment of technical universities.</a:t>
+            </a:r>
+            <a:endParaRPr lang="pl-PL" sz="1800" b="0" i="0" u="none" strike="noStrike" baseline="0" dirty="0">
+              <a:latin typeface="CIDFont+F1"/>
+            </a:endParaRPr>
+          </a:p>
+          <a:p>
+            <a:pPr algn="l"/>
+            <a:r>
+              <a:rPr lang="pl-PL" sz="1800" b="0" i="0" u="none" strike="noStrike" baseline="0" dirty="0">
+                <a:latin typeface="CIDFont+F1"/>
+              </a:rPr>
+              <a:t>The </a:t>
+            </a:r>
+            <a:r>
+              <a:rPr lang="pl-PL" sz="1800" b="0" i="0" u="none" strike="noStrike" baseline="0" dirty="0" err="1">
+                <a:latin typeface="CIDFont+F1"/>
+              </a:rPr>
+              <a:t>strong</a:t>
+            </a:r>
+            <a:r>
+              <a:rPr lang="pl-PL" sz="1800" b="0" i="0" u="none" strike="noStrike" baseline="0" dirty="0">
+                <a:latin typeface="CIDFont+F1"/>
+              </a:rPr>
+              <a:t> </a:t>
+            </a:r>
+            <a:r>
+              <a:rPr lang="pl-PL" sz="1800" b="0" i="0" u="none" strike="noStrike" baseline="0" dirty="0" err="1">
+                <a:latin typeface="CIDFont+F1"/>
+              </a:rPr>
+              <a:t>connections</a:t>
+            </a:r>
+            <a:r>
+              <a:rPr lang="pl-PL" sz="1800" b="0" i="0" u="none" strike="noStrike" baseline="0" dirty="0">
+                <a:latin typeface="CIDFont+F1"/>
+              </a:rPr>
+              <a:t> </a:t>
+            </a:r>
+            <a:r>
+              <a:rPr lang="en-US" sz="1800" b="0" i="0" u="none" strike="noStrike" baseline="0" dirty="0">
+                <a:latin typeface="CIDFont+F1"/>
+              </a:rPr>
+              <a:t>of the proposed model with the field of quality management are also confirmed by analyses indicating</a:t>
+            </a:r>
+            <a:r>
+              <a:rPr lang="pl-PL" sz="1800" b="0" i="0" u="none" strike="noStrike" baseline="0" dirty="0">
+                <a:latin typeface="CIDFont+F1"/>
+              </a:rPr>
+              <a:t> </a:t>
+            </a:r>
+            <a:r>
+              <a:rPr lang="en-US" sz="1800" b="0" i="0" u="none" strike="noStrike" baseline="0" dirty="0">
+                <a:latin typeface="CIDFont+F1"/>
+              </a:rPr>
+              <a:t>that the application of SSDQM can provide very good preparation for organizations to implement the</a:t>
+            </a:r>
+            <a:r>
+              <a:rPr lang="pl-PL" sz="1800" b="0" i="0" u="none" strike="noStrike" baseline="0" dirty="0">
+                <a:latin typeface="CIDFont+F1"/>
+              </a:rPr>
+              <a:t> </a:t>
+            </a:r>
+            <a:r>
+              <a:rPr lang="en-US" sz="1800" b="0" i="0" u="none" strike="noStrike" baseline="0" dirty="0">
+                <a:latin typeface="CIDFont+F1"/>
+              </a:rPr>
+              <a:t>requirements of the ISO</a:t>
+            </a:r>
+            <a:r>
+              <a:rPr lang="pl-PL" sz="1800" dirty="0">
+                <a:latin typeface="CIDFont+F1"/>
+              </a:rPr>
+              <a:t> </a:t>
+            </a:r>
+            <a:r>
+              <a:rPr lang="en-US" sz="1800" b="0" i="0" u="none" strike="noStrike" baseline="0" dirty="0">
+                <a:latin typeface="CIDFont+F1"/>
+              </a:rPr>
+              <a:t>21001:2018 and other standards and requirements that promote focus on</a:t>
+            </a:r>
+            <a:r>
+              <a:rPr lang="pl-PL" sz="1800" b="0" i="0" u="none" strike="noStrike" baseline="0" dirty="0">
+                <a:latin typeface="CIDFont+F1"/>
+              </a:rPr>
+              <a:t> </a:t>
+            </a:r>
+            <a:r>
+              <a:rPr lang="pl-PL" sz="1800" b="0" i="0" u="none" strike="noStrike" baseline="0" dirty="0" err="1">
+                <a:latin typeface="CIDFont+F1"/>
+              </a:rPr>
+              <a:t>stakeholders</a:t>
+            </a:r>
+            <a:r>
+              <a:rPr lang="pl-PL" sz="1800" b="0" i="0" u="none" strike="noStrike" baseline="0" dirty="0">
+                <a:latin typeface="CIDFont+F1"/>
+              </a:rPr>
+              <a:t>.</a:t>
+            </a:r>
+            <a:endParaRPr lang="pl-PL" dirty="0"/>
+          </a:p>
+        </p:txBody>
+      </p:sp>
+    </p:spTree>
+    <p:extLst>
+      <p:ext uri="{BB962C8B-B14F-4D97-AF65-F5344CB8AC3E}">
+        <p14:creationId xmlns:p14="http://schemas.microsoft.com/office/powerpoint/2010/main" val="1751899173"/>
+      </p:ext>
+    </p:extLst>
+  </p:cSld>
+  <p:clrMapOvr>
+    <a:masterClrMapping/>
+  </p:clrMapOvr>
+</p:sld>
+</file>
+
+<file path=ppt/slides/slide8.xml><?xml version="1.0" encoding="utf-8"?>
+<p:sld xmlns:a="http://schemas.openxmlformats.org/drawingml/2006/main" xmlns:r="http://schemas.openxmlformats.org/officeDocument/2006/relationships" xmlns:p="http://schemas.openxmlformats.org/presentationml/2006/main">
+  <p:cSld>
+    <p:spTree>
+      <p:nvGrpSpPr>
+        <p:cNvPr id="1" name=""/>
+        <p:cNvGrpSpPr/>
+        <p:nvPr/>
+      </p:nvGrpSpPr>
+      <p:grpSpPr>
+        <a:xfrm>
+          <a:off x="0" y="0"/>
+          <a:ext cx="0" cy="0"/>
+          <a:chOff x="0" y="0"/>
+          <a:chExt cx="0" cy="0"/>
+        </a:xfrm>
+      </p:grpSpPr>
+      <p:sp>
+        <p:nvSpPr>
+          <p:cNvPr id="2" name="Tytuł 1">
+            <a:extLst>
+              <a:ext uri="{FF2B5EF4-FFF2-40B4-BE49-F238E27FC236}">
+                <a16:creationId xmlns:a16="http://schemas.microsoft.com/office/drawing/2014/main" id="{01EAFA99-E6F6-9C32-FCD9-295254D965A1}"/>
+              </a:ext>
+            </a:extLst>
+          </p:cNvPr>
+          <p:cNvSpPr>
+            <a:spLocks noGrp="1"/>
+          </p:cNvSpPr>
+          <p:nvPr>
+            <p:ph type="title"/>
+          </p:nvPr>
+        </p:nvSpPr>
+        <p:spPr/>
+        <p:txBody>
+          <a:bodyPr/>
+          <a:lstStyle/>
+          <a:p>
+            <a:r>
+              <a:rPr lang="pl-PL" dirty="0" err="1"/>
+              <a:t>Literature</a:t>
+            </a:r>
+            <a:endParaRPr lang="pl-PL" dirty="0"/>
+          </a:p>
+        </p:txBody>
+      </p:sp>
+      <p:sp>
+        <p:nvSpPr>
+          <p:cNvPr id="3" name="Symbol zastępczy zawartości 2">
+            <a:extLst>
+              <a:ext uri="{FF2B5EF4-FFF2-40B4-BE49-F238E27FC236}">
+                <a16:creationId xmlns:a16="http://schemas.microsoft.com/office/drawing/2014/main" id="{9AEEA72C-DA17-8133-04DC-5D0CEE84D90D}"/>
+              </a:ext>
+            </a:extLst>
+          </p:cNvPr>
+          <p:cNvSpPr>
+            <a:spLocks noGrp="1"/>
+          </p:cNvSpPr>
+          <p:nvPr>
+            <p:ph idx="1"/>
+          </p:nvPr>
+        </p:nvSpPr>
+        <p:spPr/>
+        <p:txBody>
+          <a:bodyPr>
+            <a:normAutofit/>
+          </a:bodyPr>
+          <a:lstStyle/>
+          <a:p>
+            <a:pPr algn="l"/>
+            <a:r>
+              <a:rPr lang="pl-PL" dirty="0"/>
+              <a:t>1. </a:t>
+            </a:r>
+            <a:r>
+              <a:rPr lang="pl-PL" dirty="0" err="1"/>
+              <a:t>Puente</a:t>
+            </a:r>
+            <a:r>
+              <a:rPr lang="pl-PL" dirty="0"/>
+              <a:t> et al. 2021</a:t>
+            </a:r>
+          </a:p>
+          <a:p>
+            <a:pPr algn="l"/>
+            <a:endParaRPr lang="pl-PL" dirty="0"/>
+          </a:p>
+        </p:txBody>
+      </p:sp>
+    </p:spTree>
+    <p:extLst>
+      <p:ext uri="{BB962C8B-B14F-4D97-AF65-F5344CB8AC3E}">
+        <p14:creationId xmlns:p14="http://schemas.microsoft.com/office/powerpoint/2010/main" val="2905408895"/>
       </p:ext>
     </p:extLst>
   </p:cSld>

</xml_diff>